<commit_message>
fixed schematic all the way down
</commit_message>
<xml_diff>
--- a/figures/z-score_schematic.pptx
+++ b/figures/z-score_schematic.pptx
@@ -117,899 +117,12 @@
   <pc:docChgLst>
     <pc:chgData name="Hollister, Jeff" userId="90904e2a-aa82-465e-9922-afce4bc6d524" providerId="ADAL" clId="{ED486670-7F59-4038-B9BC-E9238978F7A3}"/>
     <pc:docChg chg="undo redo custSel delSld modSld">
-      <pc:chgData name="Hollister, Jeff" userId="90904e2a-aa82-465e-9922-afce4bc6d524" providerId="ADAL" clId="{ED486670-7F59-4038-B9BC-E9238978F7A3}" dt="2019-05-06T17:24:18.589" v="2381" actId="20577"/>
+      <pc:chgData name="Hollister, Jeff" userId="90904e2a-aa82-465e-9922-afce4bc6d524" providerId="ADAL" clId="{ED486670-7F59-4038-B9BC-E9238978F7A3}" dt="2019-05-14T12:46:40.107" v="2437" actId="20577"/>
       <pc:docMkLst>
         <pc:docMk/>
       </pc:docMkLst>
-      <pc:sldChg chg="addSp delSp modSp del">
-        <pc:chgData name="Hollister, Jeff" userId="90904e2a-aa82-465e-9922-afce4bc6d524" providerId="ADAL" clId="{ED486670-7F59-4038-B9BC-E9238978F7A3}" dt="2019-05-06T14:14:19.989" v="2261" actId="2696"/>
-        <pc:sldMkLst>
-          <pc:docMk/>
-          <pc:sldMk cId="4037393715" sldId="256"/>
-        </pc:sldMkLst>
-        <pc:spChg chg="add mod">
-          <ac:chgData name="Hollister, Jeff" userId="90904e2a-aa82-465e-9922-afce4bc6d524" providerId="ADAL" clId="{ED486670-7F59-4038-B9BC-E9238978F7A3}" dt="2019-05-06T12:58:20.559" v="1568" actId="164"/>
-          <ac:spMkLst>
-            <pc:docMk/>
-            <pc:sldMk cId="4037393715" sldId="256"/>
-            <ac:spMk id="2" creationId="{6C56BEAB-01BB-4A01-9A49-8F5AF03418B2}"/>
-          </ac:spMkLst>
-        </pc:spChg>
-        <pc:spChg chg="add del mod">
-          <ac:chgData name="Hollister, Jeff" userId="90904e2a-aa82-465e-9922-afce4bc6d524" providerId="ADAL" clId="{ED486670-7F59-4038-B9BC-E9238978F7A3}" dt="2019-05-02T17:52:19.352" v="216" actId="478"/>
-          <ac:spMkLst>
-            <pc:docMk/>
-            <pc:sldMk cId="4037393715" sldId="256"/>
-            <ac:spMk id="3" creationId="{6C369E69-8F2A-48AA-82F4-6E325A09508B}"/>
-          </ac:spMkLst>
-        </pc:spChg>
-        <pc:spChg chg="mod">
-          <ac:chgData name="Hollister, Jeff" userId="90904e2a-aa82-465e-9922-afce4bc6d524" providerId="ADAL" clId="{ED486670-7F59-4038-B9BC-E9238978F7A3}" dt="2019-05-06T12:57:35.446" v="1534" actId="1037"/>
-          <ac:spMkLst>
-            <pc:docMk/>
-            <pc:sldMk cId="4037393715" sldId="256"/>
-            <ac:spMk id="4" creationId="{9DAAA7D2-1A2B-4088-BAD1-9556A15760E2}"/>
-          </ac:spMkLst>
-        </pc:spChg>
-        <pc:spChg chg="mod">
-          <ac:chgData name="Hollister, Jeff" userId="90904e2a-aa82-465e-9922-afce4bc6d524" providerId="ADAL" clId="{ED486670-7F59-4038-B9BC-E9238978F7A3}" dt="2019-05-06T12:57:35.446" v="1534" actId="1037"/>
-          <ac:spMkLst>
-            <pc:docMk/>
-            <pc:sldMk cId="4037393715" sldId="256"/>
-            <ac:spMk id="5" creationId="{8C9786EB-34F3-4C77-BDCA-E8BD08FE1D11}"/>
-          </ac:spMkLst>
-        </pc:spChg>
-        <pc:spChg chg="mod">
-          <ac:chgData name="Hollister, Jeff" userId="90904e2a-aa82-465e-9922-afce4bc6d524" providerId="ADAL" clId="{ED486670-7F59-4038-B9BC-E9238978F7A3}" dt="2019-05-06T12:57:35.446" v="1534" actId="1037"/>
-          <ac:spMkLst>
-            <pc:docMk/>
-            <pc:sldMk cId="4037393715" sldId="256"/>
-            <ac:spMk id="6" creationId="{6A1187EE-F5D0-4199-837E-29800767DC0A}"/>
-          </ac:spMkLst>
-        </pc:spChg>
-        <pc:spChg chg="mod">
-          <ac:chgData name="Hollister, Jeff" userId="90904e2a-aa82-465e-9922-afce4bc6d524" providerId="ADAL" clId="{ED486670-7F59-4038-B9BC-E9238978F7A3}" dt="2019-05-02T16:27:43.096" v="210" actId="255"/>
-          <ac:spMkLst>
-            <pc:docMk/>
-            <pc:sldMk cId="4037393715" sldId="256"/>
-            <ac:spMk id="7" creationId="{78AB19B3-7DF4-4103-B447-9726179C1822}"/>
-          </ac:spMkLst>
-        </pc:spChg>
-        <pc:spChg chg="mod">
-          <ac:chgData name="Hollister, Jeff" userId="90904e2a-aa82-465e-9922-afce4bc6d524" providerId="ADAL" clId="{ED486670-7F59-4038-B9BC-E9238978F7A3}" dt="2019-05-02T16:27:50.417" v="213" actId="404"/>
-          <ac:spMkLst>
-            <pc:docMk/>
-            <pc:sldMk cId="4037393715" sldId="256"/>
-            <ac:spMk id="8" creationId="{4CA24146-E92A-4417-8FA0-B675C21987B3}"/>
-          </ac:spMkLst>
-        </pc:spChg>
-        <pc:spChg chg="mod">
-          <ac:chgData name="Hollister, Jeff" userId="90904e2a-aa82-465e-9922-afce4bc6d524" providerId="ADAL" clId="{ED486670-7F59-4038-B9BC-E9238978F7A3}" dt="2019-05-02T16:27:54.568" v="214" actId="404"/>
-          <ac:spMkLst>
-            <pc:docMk/>
-            <pc:sldMk cId="4037393715" sldId="256"/>
-            <ac:spMk id="9" creationId="{AFC3A614-EDF0-4DE1-A14E-AEA75B26B4BB}"/>
-          </ac:spMkLst>
-        </pc:spChg>
-        <pc:spChg chg="add del mod">
-          <ac:chgData name="Hollister, Jeff" userId="90904e2a-aa82-465e-9922-afce4bc6d524" providerId="ADAL" clId="{ED486670-7F59-4038-B9BC-E9238978F7A3}" dt="2019-05-02T17:52:22.126" v="217" actId="478"/>
-          <ac:spMkLst>
-            <pc:docMk/>
-            <pc:sldMk cId="4037393715" sldId="256"/>
-            <ac:spMk id="10" creationId="{366AC054-ECA9-4FC9-B2C4-A032A508C6AB}"/>
-          </ac:spMkLst>
-        </pc:spChg>
-        <pc:spChg chg="del mod">
-          <ac:chgData name="Hollister, Jeff" userId="90904e2a-aa82-465e-9922-afce4bc6d524" providerId="ADAL" clId="{ED486670-7F59-4038-B9BC-E9238978F7A3}" dt="2019-05-02T16:01:56.680" v="1" actId="478"/>
-          <ac:spMkLst>
-            <pc:docMk/>
-            <pc:sldMk cId="4037393715" sldId="256"/>
-            <ac:spMk id="12" creationId="{E26FC335-6470-4F65-A27A-ABD6BF72AF20}"/>
-          </ac:spMkLst>
-        </pc:spChg>
-        <pc:spChg chg="del">
-          <ac:chgData name="Hollister, Jeff" userId="90904e2a-aa82-465e-9922-afce4bc6d524" providerId="ADAL" clId="{ED486670-7F59-4038-B9BC-E9238978F7A3}" dt="2019-05-02T16:02:15.785" v="9" actId="478"/>
-          <ac:spMkLst>
-            <pc:docMk/>
-            <pc:sldMk cId="4037393715" sldId="256"/>
-            <ac:spMk id="13" creationId="{1F89BDFB-FD54-443B-89A7-0E102DD69BE0}"/>
-          </ac:spMkLst>
-        </pc:spChg>
-        <pc:spChg chg="del">
-          <ac:chgData name="Hollister, Jeff" userId="90904e2a-aa82-465e-9922-afce4bc6d524" providerId="ADAL" clId="{ED486670-7F59-4038-B9BC-E9238978F7A3}" dt="2019-05-02T16:02:17.345" v="10" actId="478"/>
-          <ac:spMkLst>
-            <pc:docMk/>
-            <pc:sldMk cId="4037393715" sldId="256"/>
-            <ac:spMk id="14" creationId="{04BE2884-0EA2-42F3-AFAC-B726D945C13C}"/>
-          </ac:spMkLst>
-        </pc:spChg>
-        <pc:spChg chg="del">
-          <ac:chgData name="Hollister, Jeff" userId="90904e2a-aa82-465e-9922-afce4bc6d524" providerId="ADAL" clId="{ED486670-7F59-4038-B9BC-E9238978F7A3}" dt="2019-05-02T16:02:05.513" v="4" actId="478"/>
-          <ac:spMkLst>
-            <pc:docMk/>
-            <pc:sldMk cId="4037393715" sldId="256"/>
-            <ac:spMk id="15" creationId="{364F0BFC-4DF9-447D-8450-9101085C5177}"/>
-          </ac:spMkLst>
-        </pc:spChg>
-        <pc:spChg chg="del">
-          <ac:chgData name="Hollister, Jeff" userId="90904e2a-aa82-465e-9922-afce4bc6d524" providerId="ADAL" clId="{ED486670-7F59-4038-B9BC-E9238978F7A3}" dt="2019-05-02T16:02:14.191" v="8" actId="478"/>
-          <ac:spMkLst>
-            <pc:docMk/>
-            <pc:sldMk cId="4037393715" sldId="256"/>
-            <ac:spMk id="17" creationId="{E9E1D1D6-1D8E-4CC9-ADFB-B6C2841046AA}"/>
-          </ac:spMkLst>
-        </pc:spChg>
-        <pc:spChg chg="del">
-          <ac:chgData name="Hollister, Jeff" userId="90904e2a-aa82-465e-9922-afce4bc6d524" providerId="ADAL" clId="{ED486670-7F59-4038-B9BC-E9238978F7A3}" dt="2019-05-02T16:02:07.391" v="5" actId="478"/>
-          <ac:spMkLst>
-            <pc:docMk/>
-            <pc:sldMk cId="4037393715" sldId="256"/>
-            <ac:spMk id="19" creationId="{50611B56-33EC-45D0-B906-B855C8DDF2E9}"/>
-          </ac:spMkLst>
-        </pc:spChg>
-        <pc:spChg chg="del">
-          <ac:chgData name="Hollister, Jeff" userId="90904e2a-aa82-465e-9922-afce4bc6d524" providerId="ADAL" clId="{ED486670-7F59-4038-B9BC-E9238978F7A3}" dt="2019-05-02T16:02:09.602" v="6" actId="478"/>
-          <ac:spMkLst>
-            <pc:docMk/>
-            <pc:sldMk cId="4037393715" sldId="256"/>
-            <ac:spMk id="20" creationId="{2C863259-D288-4427-A5DA-64C647A8BA5E}"/>
-          </ac:spMkLst>
-        </pc:spChg>
-        <pc:spChg chg="del">
-          <ac:chgData name="Hollister, Jeff" userId="90904e2a-aa82-465e-9922-afce4bc6d524" providerId="ADAL" clId="{ED486670-7F59-4038-B9BC-E9238978F7A3}" dt="2019-05-02T16:02:12.603" v="7" actId="478"/>
-          <ac:spMkLst>
-            <pc:docMk/>
-            <pc:sldMk cId="4037393715" sldId="256"/>
-            <ac:spMk id="21" creationId="{562B3502-CD93-41AA-AC03-E1E62B619144}"/>
-          </ac:spMkLst>
-        </pc:spChg>
-        <pc:spChg chg="mod topLvl">
-          <ac:chgData name="Hollister, Jeff" userId="90904e2a-aa82-465e-9922-afce4bc6d524" providerId="ADAL" clId="{ED486670-7F59-4038-B9BC-E9238978F7A3}" dt="2019-05-06T12:29:42.082" v="1477" actId="1036"/>
-          <ac:spMkLst>
-            <pc:docMk/>
-            <pc:sldMk cId="4037393715" sldId="256"/>
-            <ac:spMk id="46" creationId="{C3A20179-B135-43EF-8DAB-9E7F9E30EB7E}"/>
-          </ac:spMkLst>
-        </pc:spChg>
-        <pc:spChg chg="mod topLvl">
-          <ac:chgData name="Hollister, Jeff" userId="90904e2a-aa82-465e-9922-afce4bc6d524" providerId="ADAL" clId="{ED486670-7F59-4038-B9BC-E9238978F7A3}" dt="2019-05-06T12:29:42.082" v="1477" actId="1036"/>
-          <ac:spMkLst>
-            <pc:docMk/>
-            <pc:sldMk cId="4037393715" sldId="256"/>
-            <ac:spMk id="47" creationId="{FE0C46E8-9AEC-473D-A4E5-7E175F91BEBD}"/>
-          </ac:spMkLst>
-        </pc:spChg>
-        <pc:spChg chg="mod topLvl">
-          <ac:chgData name="Hollister, Jeff" userId="90904e2a-aa82-465e-9922-afce4bc6d524" providerId="ADAL" clId="{ED486670-7F59-4038-B9BC-E9238978F7A3}" dt="2019-05-06T12:29:42.082" v="1477" actId="1036"/>
-          <ac:spMkLst>
-            <pc:docMk/>
-            <pc:sldMk cId="4037393715" sldId="256"/>
-            <ac:spMk id="48" creationId="{643CB40A-4BCF-4B4D-8D89-F0145DFA33D3}"/>
-          </ac:spMkLst>
-        </pc:spChg>
-        <pc:spChg chg="add mod">
-          <ac:chgData name="Hollister, Jeff" userId="90904e2a-aa82-465e-9922-afce4bc6d524" providerId="ADAL" clId="{ED486670-7F59-4038-B9BC-E9238978F7A3}" dt="2019-05-06T12:58:35.769" v="1570" actId="164"/>
-          <ac:spMkLst>
-            <pc:docMk/>
-            <pc:sldMk cId="4037393715" sldId="256"/>
-            <ac:spMk id="49" creationId="{C0EDB5EE-0710-4F80-A28A-F28C8344FD08}"/>
-          </ac:spMkLst>
-        </pc:spChg>
-        <pc:spChg chg="add mod">
-          <ac:chgData name="Hollister, Jeff" userId="90904e2a-aa82-465e-9922-afce4bc6d524" providerId="ADAL" clId="{ED486670-7F59-4038-B9BC-E9238978F7A3}" dt="2019-05-06T12:58:46.685" v="1572" actId="164"/>
-          <ac:spMkLst>
-            <pc:docMk/>
-            <pc:sldMk cId="4037393715" sldId="256"/>
-            <ac:spMk id="50" creationId="{EEC9AD62-41CA-446F-BF69-BDDBB3D2CEF9}"/>
-          </ac:spMkLst>
-        </pc:spChg>
-        <pc:spChg chg="add del mod">
-          <ac:chgData name="Hollister, Jeff" userId="90904e2a-aa82-465e-9922-afce4bc6d524" providerId="ADAL" clId="{ED486670-7F59-4038-B9BC-E9238978F7A3}" dt="2019-05-02T17:52:26.451" v="219" actId="478"/>
-          <ac:spMkLst>
-            <pc:docMk/>
-            <pc:sldMk cId="4037393715" sldId="256"/>
-            <ac:spMk id="51" creationId="{199FB866-3BE1-43EF-BE72-8F021F0FC074}"/>
-          </ac:spMkLst>
-        </pc:spChg>
-        <pc:spChg chg="add del">
-          <ac:chgData name="Hollister, Jeff" userId="90904e2a-aa82-465e-9922-afce4bc6d524" providerId="ADAL" clId="{ED486670-7F59-4038-B9BC-E9238978F7A3}" dt="2019-05-02T16:03:59.492" v="37" actId="478"/>
-          <ac:spMkLst>
-            <pc:docMk/>
-            <pc:sldMk cId="4037393715" sldId="256"/>
-            <ac:spMk id="52" creationId="{6DC39AA0-064C-4879-A93C-72B80A76D3CF}"/>
-          </ac:spMkLst>
-        </pc:spChg>
-        <pc:spChg chg="mod">
-          <ac:chgData name="Hollister, Jeff" userId="90904e2a-aa82-465e-9922-afce4bc6d524" providerId="ADAL" clId="{ED486670-7F59-4038-B9BC-E9238978F7A3}" dt="2019-05-06T12:58:20.559" v="1568" actId="164"/>
-          <ac:spMkLst>
-            <pc:docMk/>
-            <pc:sldMk cId="4037393715" sldId="256"/>
-            <ac:spMk id="53" creationId="{63E96BA2-DCBA-4505-BDD2-C510302C3B6B}"/>
-          </ac:spMkLst>
-        </pc:spChg>
-        <pc:spChg chg="del">
-          <ac:chgData name="Hollister, Jeff" userId="90904e2a-aa82-465e-9922-afce4bc6d524" providerId="ADAL" clId="{ED486670-7F59-4038-B9BC-E9238978F7A3}" dt="2019-05-02T16:19:08.982" v="142" actId="478"/>
-          <ac:spMkLst>
-            <pc:docMk/>
-            <pc:sldMk cId="4037393715" sldId="256"/>
-            <ac:spMk id="54" creationId="{0A030AEA-041C-426D-9CE6-CD55B2C6FDD3}"/>
-          </ac:spMkLst>
-        </pc:spChg>
-        <pc:spChg chg="del mod">
-          <ac:chgData name="Hollister, Jeff" userId="90904e2a-aa82-465e-9922-afce4bc6d524" providerId="ADAL" clId="{ED486670-7F59-4038-B9BC-E9238978F7A3}" dt="2019-05-02T16:19:24.005" v="148"/>
-          <ac:spMkLst>
-            <pc:docMk/>
-            <pc:sldMk cId="4037393715" sldId="256"/>
-            <ac:spMk id="55" creationId="{4F105DC3-8040-4C49-BD22-72A8193C024A}"/>
-          </ac:spMkLst>
-        </pc:spChg>
-        <pc:spChg chg="del mod">
-          <ac:chgData name="Hollister, Jeff" userId="90904e2a-aa82-465e-9922-afce4bc6d524" providerId="ADAL" clId="{ED486670-7F59-4038-B9BC-E9238978F7A3}" dt="2019-05-02T17:57:44.616" v="365"/>
-          <ac:spMkLst>
-            <pc:docMk/>
-            <pc:sldMk cId="4037393715" sldId="256"/>
-            <ac:spMk id="56" creationId="{8CF07A81-401C-4295-BBCB-08E28EC6D233}"/>
-          </ac:spMkLst>
-        </pc:spChg>
-        <pc:spChg chg="del mod">
-          <ac:chgData name="Hollister, Jeff" userId="90904e2a-aa82-465e-9922-afce4bc6d524" providerId="ADAL" clId="{ED486670-7F59-4038-B9BC-E9238978F7A3}" dt="2019-05-02T17:57:44.615" v="363" actId="478"/>
-          <ac:spMkLst>
-            <pc:docMk/>
-            <pc:sldMk cId="4037393715" sldId="256"/>
-            <ac:spMk id="57" creationId="{CB82CA4F-7C37-48D6-B4A7-015B5EABBBF8}"/>
-          </ac:spMkLst>
-        </pc:spChg>
-        <pc:spChg chg="del">
-          <ac:chgData name="Hollister, Jeff" userId="90904e2a-aa82-465e-9922-afce4bc6d524" providerId="ADAL" clId="{ED486670-7F59-4038-B9BC-E9238978F7A3}" dt="2019-05-02T17:57:46.682" v="366" actId="478"/>
-          <ac:spMkLst>
-            <pc:docMk/>
-            <pc:sldMk cId="4037393715" sldId="256"/>
-            <ac:spMk id="58" creationId="{5670797B-7396-4519-BE29-9FAC9DAEA24E}"/>
-          </ac:spMkLst>
-        </pc:spChg>
-        <pc:spChg chg="add del mod">
-          <ac:chgData name="Hollister, Jeff" userId="90904e2a-aa82-465e-9922-afce4bc6d524" providerId="ADAL" clId="{ED486670-7F59-4038-B9BC-E9238978F7A3}" dt="2019-05-02T18:16:59.903" v="502" actId="478"/>
-          <ac:spMkLst>
-            <pc:docMk/>
-            <pc:sldMk cId="4037393715" sldId="256"/>
-            <ac:spMk id="59" creationId="{A1DFE03C-224B-4232-B820-8D810003A5C6}"/>
-          </ac:spMkLst>
-        </pc:spChg>
-        <pc:spChg chg="del mod">
-          <ac:chgData name="Hollister, Jeff" userId="90904e2a-aa82-465e-9922-afce4bc6d524" providerId="ADAL" clId="{ED486670-7F59-4038-B9BC-E9238978F7A3}" dt="2019-05-02T18:17:49.868" v="522" actId="478"/>
-          <ac:spMkLst>
-            <pc:docMk/>
-            <pc:sldMk cId="4037393715" sldId="256"/>
-            <ac:spMk id="60" creationId="{34A0E35A-E8F9-4964-A87B-E0B3938DC33E}"/>
-          </ac:spMkLst>
-        </pc:spChg>
-        <pc:spChg chg="del mod">
-          <ac:chgData name="Hollister, Jeff" userId="90904e2a-aa82-465e-9922-afce4bc6d524" providerId="ADAL" clId="{ED486670-7F59-4038-B9BC-E9238978F7A3}" dt="2019-05-02T16:19:31.538" v="151" actId="478"/>
-          <ac:spMkLst>
-            <pc:docMk/>
-            <pc:sldMk cId="4037393715" sldId="256"/>
-            <ac:spMk id="61" creationId="{DBB47FA4-DE84-4340-A88B-3C2EF6E6AB68}"/>
-          </ac:spMkLst>
-        </pc:spChg>
-        <pc:spChg chg="add del mod">
-          <ac:chgData name="Hollister, Jeff" userId="90904e2a-aa82-465e-9922-afce4bc6d524" providerId="ADAL" clId="{ED486670-7F59-4038-B9BC-E9238978F7A3}" dt="2019-05-02T18:18:36.153" v="537" actId="478"/>
-          <ac:spMkLst>
-            <pc:docMk/>
-            <pc:sldMk cId="4037393715" sldId="256"/>
-            <ac:spMk id="62" creationId="{5722917B-5E11-4324-86D2-F79F1C23B6FB}"/>
-          </ac:spMkLst>
-        </pc:spChg>
-        <pc:spChg chg="del mod">
-          <ac:chgData name="Hollister, Jeff" userId="90904e2a-aa82-465e-9922-afce4bc6d524" providerId="ADAL" clId="{ED486670-7F59-4038-B9BC-E9238978F7A3}" dt="2019-05-02T16:22:20.220" v="174" actId="478"/>
-          <ac:spMkLst>
-            <pc:docMk/>
-            <pc:sldMk cId="4037393715" sldId="256"/>
-            <ac:spMk id="63" creationId="{FA603794-3FE2-47F2-8550-98A888649FE8}"/>
-          </ac:spMkLst>
-        </pc:spChg>
-        <pc:spChg chg="del">
-          <ac:chgData name="Hollister, Jeff" userId="90904e2a-aa82-465e-9922-afce4bc6d524" providerId="ADAL" clId="{ED486670-7F59-4038-B9BC-E9238978F7A3}" dt="2019-05-02T16:22:23.131" v="175" actId="478"/>
-          <ac:spMkLst>
-            <pc:docMk/>
-            <pc:sldMk cId="4037393715" sldId="256"/>
-            <ac:spMk id="64" creationId="{52601761-FDEE-4B0E-8BD2-4FE70C22DBC1}"/>
-          </ac:spMkLst>
-        </pc:spChg>
-        <pc:spChg chg="del">
-          <ac:chgData name="Hollister, Jeff" userId="90904e2a-aa82-465e-9922-afce4bc6d524" providerId="ADAL" clId="{ED486670-7F59-4038-B9BC-E9238978F7A3}" dt="2019-05-02T16:22:25.268" v="176" actId="478"/>
-          <ac:spMkLst>
-            <pc:docMk/>
-            <pc:sldMk cId="4037393715" sldId="256"/>
-            <ac:spMk id="65" creationId="{081DC5C0-5968-476B-AC01-5DD30BBA1A5B}"/>
-          </ac:spMkLst>
-        </pc:spChg>
-        <pc:spChg chg="add del mod">
-          <ac:chgData name="Hollister, Jeff" userId="90904e2a-aa82-465e-9922-afce4bc6d524" providerId="ADAL" clId="{ED486670-7F59-4038-B9BC-E9238978F7A3}" dt="2019-05-02T17:52:25.079" v="218" actId="478"/>
-          <ac:spMkLst>
-            <pc:docMk/>
-            <pc:sldMk cId="4037393715" sldId="256"/>
-            <ac:spMk id="66" creationId="{11AD7CB3-59FC-41DB-8224-0D399B64038E}"/>
-          </ac:spMkLst>
-        </pc:spChg>
-        <pc:spChg chg="add del mod">
-          <ac:chgData name="Hollister, Jeff" userId="90904e2a-aa82-465e-9922-afce4bc6d524" providerId="ADAL" clId="{ED486670-7F59-4038-B9BC-E9238978F7A3}" dt="2019-05-02T17:52:27.597" v="220" actId="478"/>
-          <ac:spMkLst>
-            <pc:docMk/>
-            <pc:sldMk cId="4037393715" sldId="256"/>
-            <ac:spMk id="67" creationId="{9209E21F-D05A-4522-A455-D256BB3B996F}"/>
-          </ac:spMkLst>
-        </pc:spChg>
-        <pc:spChg chg="del mod">
-          <ac:chgData name="Hollister, Jeff" userId="90904e2a-aa82-465e-9922-afce4bc6d524" providerId="ADAL" clId="{ED486670-7F59-4038-B9BC-E9238978F7A3}" dt="2019-05-02T18:17:25.453" v="510" actId="478"/>
-          <ac:spMkLst>
-            <pc:docMk/>
-            <pc:sldMk cId="4037393715" sldId="256"/>
-            <ac:spMk id="68" creationId="{65F819A5-6435-4F89-947C-6B2D53C6CE3D}"/>
-          </ac:spMkLst>
-        </pc:spChg>
-        <pc:spChg chg="add mod">
-          <ac:chgData name="Hollister, Jeff" userId="90904e2a-aa82-465e-9922-afce4bc6d524" providerId="ADAL" clId="{ED486670-7F59-4038-B9BC-E9238978F7A3}" dt="2019-05-02T16:15:47.409" v="134" actId="571"/>
-          <ac:spMkLst>
-            <pc:docMk/>
-            <pc:sldMk cId="4037393715" sldId="256"/>
-            <ac:spMk id="69" creationId="{1871C07C-8BE3-43DE-9E4A-CC6899B1E9A3}"/>
-          </ac:spMkLst>
-        </pc:spChg>
-        <pc:spChg chg="del mod">
-          <ac:chgData name="Hollister, Jeff" userId="90904e2a-aa82-465e-9922-afce4bc6d524" providerId="ADAL" clId="{ED486670-7F59-4038-B9BC-E9238978F7A3}" dt="2019-05-02T17:58:12.978" v="374" actId="478"/>
-          <ac:spMkLst>
-            <pc:docMk/>
-            <pc:sldMk cId="4037393715" sldId="256"/>
-            <ac:spMk id="70" creationId="{6846EA3B-C941-418F-97DC-AAE516B4683B}"/>
-          </ac:spMkLst>
-        </pc:spChg>
-        <pc:spChg chg="del">
-          <ac:chgData name="Hollister, Jeff" userId="90904e2a-aa82-465e-9922-afce4bc6d524" providerId="ADAL" clId="{ED486670-7F59-4038-B9BC-E9238978F7A3}" dt="2019-05-02T17:58:08.506" v="372" actId="478"/>
-          <ac:spMkLst>
-            <pc:docMk/>
-            <pc:sldMk cId="4037393715" sldId="256"/>
-            <ac:spMk id="71" creationId="{9AC981CD-FDE8-4D46-903A-F5D77DFA291D}"/>
-          </ac:spMkLst>
-        </pc:spChg>
-        <pc:spChg chg="add mod">
-          <ac:chgData name="Hollister, Jeff" userId="90904e2a-aa82-465e-9922-afce4bc6d524" providerId="ADAL" clId="{ED486670-7F59-4038-B9BC-E9238978F7A3}" dt="2019-05-02T16:15:47.409" v="134" actId="571"/>
-          <ac:spMkLst>
-            <pc:docMk/>
-            <pc:sldMk cId="4037393715" sldId="256"/>
-            <ac:spMk id="72" creationId="{338D0E68-C6CE-4FBF-8B1D-6186B0376054}"/>
-          </ac:spMkLst>
-        </pc:spChg>
-        <pc:spChg chg="del">
-          <ac:chgData name="Hollister, Jeff" userId="90904e2a-aa82-465e-9922-afce4bc6d524" providerId="ADAL" clId="{ED486670-7F59-4038-B9BC-E9238978F7A3}" dt="2019-05-02T16:22:35.011" v="179" actId="478"/>
-          <ac:spMkLst>
-            <pc:docMk/>
-            <pc:sldMk cId="4037393715" sldId="256"/>
-            <ac:spMk id="73" creationId="{60C7C5C7-82D5-44CE-8678-52499A455C6A}"/>
-          </ac:spMkLst>
-        </pc:spChg>
-        <pc:spChg chg="del mod">
-          <ac:chgData name="Hollister, Jeff" userId="90904e2a-aa82-465e-9922-afce4bc6d524" providerId="ADAL" clId="{ED486670-7F59-4038-B9BC-E9238978F7A3}" dt="2019-05-02T18:16:05.475" v="486" actId="478"/>
-          <ac:spMkLst>
-            <pc:docMk/>
-            <pc:sldMk cId="4037393715" sldId="256"/>
-            <ac:spMk id="74" creationId="{AD8C9A75-532E-4991-8CEC-3A5EA65B2E1E}"/>
-          </ac:spMkLst>
-        </pc:spChg>
-        <pc:spChg chg="del">
-          <ac:chgData name="Hollister, Jeff" userId="90904e2a-aa82-465e-9922-afce4bc6d524" providerId="ADAL" clId="{ED486670-7F59-4038-B9BC-E9238978F7A3}" dt="2019-05-02T16:20:25.861" v="162" actId="478"/>
-          <ac:spMkLst>
-            <pc:docMk/>
-            <pc:sldMk cId="4037393715" sldId="256"/>
-            <ac:spMk id="75" creationId="{5F6188CB-107D-427D-A3B9-F0F1E439BB56}"/>
-          </ac:spMkLst>
-        </pc:spChg>
-        <pc:spChg chg="del mod">
-          <ac:chgData name="Hollister, Jeff" userId="90904e2a-aa82-465e-9922-afce4bc6d524" providerId="ADAL" clId="{ED486670-7F59-4038-B9BC-E9238978F7A3}" dt="2019-05-02T16:20:22.999" v="161" actId="478"/>
-          <ac:spMkLst>
-            <pc:docMk/>
-            <pc:sldMk cId="4037393715" sldId="256"/>
-            <ac:spMk id="76" creationId="{29BB147C-886C-4294-9982-046E1CBEAB4F}"/>
-          </ac:spMkLst>
-        </pc:spChg>
-        <pc:spChg chg="del mod">
-          <ac:chgData name="Hollister, Jeff" userId="90904e2a-aa82-465e-9922-afce4bc6d524" providerId="ADAL" clId="{ED486670-7F59-4038-B9BC-E9238978F7A3}" dt="2019-05-02T18:19:45.124" v="549" actId="478"/>
-          <ac:spMkLst>
-            <pc:docMk/>
-            <pc:sldMk cId="4037393715" sldId="256"/>
-            <ac:spMk id="77" creationId="{AD1E8905-7E57-4BD8-8A18-BC458AB5BFCF}"/>
-          </ac:spMkLst>
-        </pc:spChg>
-        <pc:spChg chg="mod">
-          <ac:chgData name="Hollister, Jeff" userId="90904e2a-aa82-465e-9922-afce4bc6d524" providerId="ADAL" clId="{ED486670-7F59-4038-B9BC-E9238978F7A3}" dt="2019-05-06T12:57:21.431" v="1518" actId="1038"/>
-          <ac:spMkLst>
-            <pc:docMk/>
-            <pc:sldMk cId="4037393715" sldId="256"/>
-            <ac:spMk id="78" creationId="{7C7F0A6A-CADA-4A85-A1AB-018058996648}"/>
-          </ac:spMkLst>
-        </pc:spChg>
-        <pc:spChg chg="add mod">
-          <ac:chgData name="Hollister, Jeff" userId="90904e2a-aa82-465e-9922-afce4bc6d524" providerId="ADAL" clId="{ED486670-7F59-4038-B9BC-E9238978F7A3}" dt="2019-05-02T16:15:47.409" v="134" actId="571"/>
-          <ac:spMkLst>
-            <pc:docMk/>
-            <pc:sldMk cId="4037393715" sldId="256"/>
-            <ac:spMk id="79" creationId="{B2A0F0F6-3791-4CBE-B3F3-D6C49F8FF007}"/>
-          </ac:spMkLst>
-        </pc:spChg>
-        <pc:spChg chg="add mod">
-          <ac:chgData name="Hollister, Jeff" userId="90904e2a-aa82-465e-9922-afce4bc6d524" providerId="ADAL" clId="{ED486670-7F59-4038-B9BC-E9238978F7A3}" dt="2019-05-06T12:58:35.769" v="1570" actId="164"/>
-          <ac:spMkLst>
-            <pc:docMk/>
-            <pc:sldMk cId="4037393715" sldId="256"/>
-            <ac:spMk id="80" creationId="{BABACCD6-1B99-4874-97AD-46FFA87B7A11}"/>
-          </ac:spMkLst>
-        </pc:spChg>
-        <pc:spChg chg="add mod">
-          <ac:chgData name="Hollister, Jeff" userId="90904e2a-aa82-465e-9922-afce4bc6d524" providerId="ADAL" clId="{ED486670-7F59-4038-B9BC-E9238978F7A3}" dt="2019-05-02T18:36:13.803" v="606" actId="14100"/>
-          <ac:spMkLst>
-            <pc:docMk/>
-            <pc:sldMk cId="4037393715" sldId="256"/>
-            <ac:spMk id="81" creationId="{F39017AD-7EFE-4788-926C-4E6BD37E1114}"/>
-          </ac:spMkLst>
-        </pc:spChg>
-        <pc:spChg chg="add mod">
-          <ac:chgData name="Hollister, Jeff" userId="90904e2a-aa82-465e-9922-afce4bc6d524" providerId="ADAL" clId="{ED486670-7F59-4038-B9BC-E9238978F7A3}" dt="2019-05-06T12:30:50.597" v="1483" actId="14100"/>
-          <ac:spMkLst>
-            <pc:docMk/>
-            <pc:sldMk cId="4037393715" sldId="256"/>
-            <ac:spMk id="82" creationId="{CDFC8B0C-23AC-4D1D-8897-C149BC512D91}"/>
-          </ac:spMkLst>
-        </pc:spChg>
-        <pc:spChg chg="add mod">
-          <ac:chgData name="Hollister, Jeff" userId="90904e2a-aa82-465e-9922-afce4bc6d524" providerId="ADAL" clId="{ED486670-7F59-4038-B9BC-E9238978F7A3}" dt="2019-05-06T12:30:50.597" v="1483" actId="14100"/>
-          <ac:spMkLst>
-            <pc:docMk/>
-            <pc:sldMk cId="4037393715" sldId="256"/>
-            <ac:spMk id="83" creationId="{6AF7727E-D979-4AF2-B823-FEC2C43106C3}"/>
-          </ac:spMkLst>
-        </pc:spChg>
-        <pc:spChg chg="add mod">
-          <ac:chgData name="Hollister, Jeff" userId="90904e2a-aa82-465e-9922-afce4bc6d524" providerId="ADAL" clId="{ED486670-7F59-4038-B9BC-E9238978F7A3}" dt="2019-05-06T12:30:50.597" v="1483" actId="14100"/>
-          <ac:spMkLst>
-            <pc:docMk/>
-            <pc:sldMk cId="4037393715" sldId="256"/>
-            <ac:spMk id="84" creationId="{8D9D8415-31BE-4B84-9ED3-ACBA082148FF}"/>
-          </ac:spMkLst>
-        </pc:spChg>
-        <pc:spChg chg="add mod">
-          <ac:chgData name="Hollister, Jeff" userId="90904e2a-aa82-465e-9922-afce4bc6d524" providerId="ADAL" clId="{ED486670-7F59-4038-B9BC-E9238978F7A3}" dt="2019-05-06T12:30:50.597" v="1483" actId="14100"/>
-          <ac:spMkLst>
-            <pc:docMk/>
-            <pc:sldMk cId="4037393715" sldId="256"/>
-            <ac:spMk id="85" creationId="{F54E2C3C-8529-4FCE-8673-6F1BA0A6F945}"/>
-          </ac:spMkLst>
-        </pc:spChg>
-        <pc:spChg chg="add mod">
-          <ac:chgData name="Hollister, Jeff" userId="90904e2a-aa82-465e-9922-afce4bc6d524" providerId="ADAL" clId="{ED486670-7F59-4038-B9BC-E9238978F7A3}" dt="2019-05-06T12:58:46.685" v="1572" actId="164"/>
-          <ac:spMkLst>
-            <pc:docMk/>
-            <pc:sldMk cId="4037393715" sldId="256"/>
-            <ac:spMk id="86" creationId="{E1E5A249-457C-4295-B7A8-24C6887E5DB6}"/>
-          </ac:spMkLst>
-        </pc:spChg>
-        <pc:spChg chg="add mod">
-          <ac:chgData name="Hollister, Jeff" userId="90904e2a-aa82-465e-9922-afce4bc6d524" providerId="ADAL" clId="{ED486670-7F59-4038-B9BC-E9238978F7A3}" dt="2019-05-06T13:00:02.490" v="1586" actId="1036"/>
-          <ac:spMkLst>
-            <pc:docMk/>
-            <pc:sldMk cId="4037393715" sldId="256"/>
-            <ac:spMk id="87" creationId="{A034A73A-A55A-42EC-B37B-966CBCF31C03}"/>
-          </ac:spMkLst>
-        </pc:spChg>
-        <pc:spChg chg="add mod">
-          <ac:chgData name="Hollister, Jeff" userId="90904e2a-aa82-465e-9922-afce4bc6d524" providerId="ADAL" clId="{ED486670-7F59-4038-B9BC-E9238978F7A3}" dt="2019-05-06T12:29:00.524" v="1457" actId="554"/>
-          <ac:spMkLst>
-            <pc:docMk/>
-            <pc:sldMk cId="4037393715" sldId="256"/>
-            <ac:spMk id="88" creationId="{74124756-EDDB-4411-B0B1-AE91317ADB06}"/>
-          </ac:spMkLst>
-        </pc:spChg>
-        <pc:spChg chg="add mod">
-          <ac:chgData name="Hollister, Jeff" userId="90904e2a-aa82-465e-9922-afce4bc6d524" providerId="ADAL" clId="{ED486670-7F59-4038-B9BC-E9238978F7A3}" dt="2019-05-06T12:29:14.919" v="1458" actId="554"/>
-          <ac:spMkLst>
-            <pc:docMk/>
-            <pc:sldMk cId="4037393715" sldId="256"/>
-            <ac:spMk id="89" creationId="{6CF321B7-0F90-4E94-A936-D5DA116AA7C8}"/>
-          </ac:spMkLst>
-        </pc:spChg>
-        <pc:spChg chg="add del">
-          <ac:chgData name="Hollister, Jeff" userId="90904e2a-aa82-465e-9922-afce4bc6d524" providerId="ADAL" clId="{ED486670-7F59-4038-B9BC-E9238978F7A3}" dt="2019-05-02T18:18:19.993" v="526"/>
-          <ac:spMkLst>
-            <pc:docMk/>
-            <pc:sldMk cId="4037393715" sldId="256"/>
-            <ac:spMk id="90" creationId="{8D7B2DD1-EE43-4FE2-BB35-8EC4A8529DA4}"/>
-          </ac:spMkLst>
-        </pc:spChg>
-        <pc:spChg chg="add mod">
-          <ac:chgData name="Hollister, Jeff" userId="90904e2a-aa82-465e-9922-afce4bc6d524" providerId="ADAL" clId="{ED486670-7F59-4038-B9BC-E9238978F7A3}" dt="2019-05-06T12:29:14.919" v="1458" actId="554"/>
-          <ac:spMkLst>
-            <pc:docMk/>
-            <pc:sldMk cId="4037393715" sldId="256"/>
-            <ac:spMk id="91" creationId="{681872E3-21D0-4CBB-A121-49398BAA84F9}"/>
-          </ac:spMkLst>
-        </pc:spChg>
-        <pc:spChg chg="add mod">
-          <ac:chgData name="Hollister, Jeff" userId="90904e2a-aa82-465e-9922-afce4bc6d524" providerId="ADAL" clId="{ED486670-7F59-4038-B9BC-E9238978F7A3}" dt="2019-05-06T12:29:14.919" v="1458" actId="554"/>
-          <ac:spMkLst>
-            <pc:docMk/>
-            <pc:sldMk cId="4037393715" sldId="256"/>
-            <ac:spMk id="92" creationId="{B10AF8BC-C583-4B94-BD50-8605C7C27D69}"/>
-          </ac:spMkLst>
-        </pc:spChg>
-        <pc:spChg chg="add mod">
-          <ac:chgData name="Hollister, Jeff" userId="90904e2a-aa82-465e-9922-afce4bc6d524" providerId="ADAL" clId="{ED486670-7F59-4038-B9BC-E9238978F7A3}" dt="2019-05-06T12:59:09.953" v="1574" actId="164"/>
-          <ac:spMkLst>
-            <pc:docMk/>
-            <pc:sldMk cId="4037393715" sldId="256"/>
-            <ac:spMk id="93" creationId="{03EC8AA9-91BF-4941-9103-3A491FE76F10}"/>
-          </ac:spMkLst>
-        </pc:spChg>
-        <pc:spChg chg="add mod">
-          <ac:chgData name="Hollister, Jeff" userId="90904e2a-aa82-465e-9922-afce4bc6d524" providerId="ADAL" clId="{ED486670-7F59-4038-B9BC-E9238978F7A3}" dt="2019-05-06T12:28:48.798" v="1456" actId="554"/>
-          <ac:spMkLst>
-            <pc:docMk/>
-            <pc:sldMk cId="4037393715" sldId="256"/>
-            <ac:spMk id="94" creationId="{61A07EEC-C58A-4746-AFA6-B9F5F0F9B7DA}"/>
-          </ac:spMkLst>
-        </pc:spChg>
-        <pc:spChg chg="add mod">
-          <ac:chgData name="Hollister, Jeff" userId="90904e2a-aa82-465e-9922-afce4bc6d524" providerId="ADAL" clId="{ED486670-7F59-4038-B9BC-E9238978F7A3}" dt="2019-05-06T12:28:48.798" v="1456" actId="554"/>
-          <ac:spMkLst>
-            <pc:docMk/>
-            <pc:sldMk cId="4037393715" sldId="256"/>
-            <ac:spMk id="95" creationId="{32EA453E-9F8A-4E1A-89B3-C467B5B9351E}"/>
-          </ac:spMkLst>
-        </pc:spChg>
-        <pc:spChg chg="add mod">
-          <ac:chgData name="Hollister, Jeff" userId="90904e2a-aa82-465e-9922-afce4bc6d524" providerId="ADAL" clId="{ED486670-7F59-4038-B9BC-E9238978F7A3}" dt="2019-05-02T18:55:01.648" v="811" actId="164"/>
-          <ac:spMkLst>
-            <pc:docMk/>
-            <pc:sldMk cId="4037393715" sldId="256"/>
-            <ac:spMk id="96" creationId="{14BCB8E2-1C0D-4D5E-BD48-91628AB4E5F4}"/>
-          </ac:spMkLst>
-        </pc:spChg>
-        <pc:spChg chg="add del mod">
-          <ac:chgData name="Hollister, Jeff" userId="90904e2a-aa82-465e-9922-afce4bc6d524" providerId="ADAL" clId="{ED486670-7F59-4038-B9BC-E9238978F7A3}" dt="2019-05-02T18:55:48.587" v="816" actId="478"/>
-          <ac:spMkLst>
-            <pc:docMk/>
-            <pc:sldMk cId="4037393715" sldId="256"/>
-            <ac:spMk id="97" creationId="{C99EE8BD-0C55-48D6-9145-61FCDD7B6005}"/>
-          </ac:spMkLst>
-        </pc:spChg>
-        <pc:spChg chg="add del mod">
-          <ac:chgData name="Hollister, Jeff" userId="90904e2a-aa82-465e-9922-afce4bc6d524" providerId="ADAL" clId="{ED486670-7F59-4038-B9BC-E9238978F7A3}" dt="2019-05-02T18:56:55.166" v="849" actId="478"/>
-          <ac:spMkLst>
-            <pc:docMk/>
-            <pc:sldMk cId="4037393715" sldId="256"/>
-            <ac:spMk id="98" creationId="{30C89F13-1657-48A6-AA06-2B7489761117}"/>
-          </ac:spMkLst>
-        </pc:spChg>
-        <pc:spChg chg="add mod">
-          <ac:chgData name="Hollister, Jeff" userId="90904e2a-aa82-465e-9922-afce4bc6d524" providerId="ADAL" clId="{ED486670-7F59-4038-B9BC-E9238978F7A3}" dt="2019-05-02T18:55:01.648" v="811" actId="164"/>
-          <ac:spMkLst>
-            <pc:docMk/>
-            <pc:sldMk cId="4037393715" sldId="256"/>
-            <ac:spMk id="99" creationId="{ED7EA899-0709-42ED-84BF-F2B0DF1CCC30}"/>
-          </ac:spMkLst>
-        </pc:spChg>
-        <pc:spChg chg="add del">
-          <ac:chgData name="Hollister, Jeff" userId="90904e2a-aa82-465e-9922-afce4bc6d524" providerId="ADAL" clId="{ED486670-7F59-4038-B9BC-E9238978F7A3}" dt="2019-05-02T18:55:20.448" v="813"/>
-          <ac:spMkLst>
-            <pc:docMk/>
-            <pc:sldMk cId="4037393715" sldId="256"/>
-            <ac:spMk id="100" creationId="{F6450B83-9879-462A-B656-81816E06D2D6}"/>
-          </ac:spMkLst>
-        </pc:spChg>
-        <pc:spChg chg="mod">
-          <ac:chgData name="Hollister, Jeff" userId="90904e2a-aa82-465e-9922-afce4bc6d524" providerId="ADAL" clId="{ED486670-7F59-4038-B9BC-E9238978F7A3}" dt="2019-05-02T18:55:58.366" v="820" actId="20577"/>
-          <ac:spMkLst>
-            <pc:docMk/>
-            <pc:sldMk cId="4037393715" sldId="256"/>
-            <ac:spMk id="102" creationId="{8B4C6213-3632-49F6-BE13-71C2AC79244D}"/>
-          </ac:spMkLst>
-        </pc:spChg>
-        <pc:spChg chg="mod">
-          <ac:chgData name="Hollister, Jeff" userId="90904e2a-aa82-465e-9922-afce4bc6d524" providerId="ADAL" clId="{ED486670-7F59-4038-B9BC-E9238978F7A3}" dt="2019-05-02T18:56:44.158" v="846" actId="20577"/>
-          <ac:spMkLst>
-            <pc:docMk/>
-            <pc:sldMk cId="4037393715" sldId="256"/>
-            <ac:spMk id="103" creationId="{B4E331AA-2DE6-448C-B158-00AE2A12FC8A}"/>
-          </ac:spMkLst>
-        </pc:spChg>
-        <pc:spChg chg="mod">
-          <ac:chgData name="Hollister, Jeff" userId="90904e2a-aa82-465e-9922-afce4bc6d524" providerId="ADAL" clId="{ED486670-7F59-4038-B9BC-E9238978F7A3}" dt="2019-05-02T18:57:14.442" v="874" actId="20577"/>
-          <ac:spMkLst>
-            <pc:docMk/>
-            <pc:sldMk cId="4037393715" sldId="256"/>
-            <ac:spMk id="106" creationId="{0BD43627-D57C-4C22-BE71-199859184EB2}"/>
-          </ac:spMkLst>
-        </pc:spChg>
-        <pc:spChg chg="mod">
-          <ac:chgData name="Hollister, Jeff" userId="90904e2a-aa82-465e-9922-afce4bc6d524" providerId="ADAL" clId="{ED486670-7F59-4038-B9BC-E9238978F7A3}" dt="2019-05-06T12:25:27.988" v="1447" actId="20577"/>
-          <ac:spMkLst>
-            <pc:docMk/>
-            <pc:sldMk cId="4037393715" sldId="256"/>
-            <ac:spMk id="107" creationId="{360DC2C8-CFCF-4B18-B5D9-01A28A7BD7A0}"/>
-          </ac:spMkLst>
-        </pc:spChg>
-        <pc:spChg chg="add mod">
-          <ac:chgData name="Hollister, Jeff" userId="90904e2a-aa82-465e-9922-afce4bc6d524" providerId="ADAL" clId="{ED486670-7F59-4038-B9BC-E9238978F7A3}" dt="2019-05-06T12:29:00.524" v="1457" actId="554"/>
-          <ac:spMkLst>
-            <pc:docMk/>
-            <pc:sldMk cId="4037393715" sldId="256"/>
-            <ac:spMk id="109" creationId="{F2325510-088D-4E4D-B7CF-0F5E7D8755F3}"/>
-          </ac:spMkLst>
-        </pc:spChg>
-        <pc:spChg chg="mod">
-          <ac:chgData name="Hollister, Jeff" userId="90904e2a-aa82-465e-9922-afce4bc6d524" providerId="ADAL" clId="{ED486670-7F59-4038-B9BC-E9238978F7A3}" dt="2019-05-02T19:05:09.984" v="1318" actId="20577"/>
-          <ac:spMkLst>
-            <pc:docMk/>
-            <pc:sldMk cId="4037393715" sldId="256"/>
-            <ac:spMk id="111" creationId="{5CB2CB70-33F4-4AF0-AF95-1292470AE5F1}"/>
-          </ac:spMkLst>
-        </pc:spChg>
-        <pc:spChg chg="mod">
-          <ac:chgData name="Hollister, Jeff" userId="90904e2a-aa82-465e-9922-afce4bc6d524" providerId="ADAL" clId="{ED486670-7F59-4038-B9BC-E9238978F7A3}" dt="2019-05-02T19:06:32.093" v="1381" actId="20577"/>
-          <ac:spMkLst>
-            <pc:docMk/>
-            <pc:sldMk cId="4037393715" sldId="256"/>
-            <ac:spMk id="112" creationId="{956A151E-9F20-4E28-AF99-50959238DA61}"/>
-          </ac:spMkLst>
-        </pc:spChg>
-        <pc:spChg chg="add mod">
-          <ac:chgData name="Hollister, Jeff" userId="90904e2a-aa82-465e-9922-afce4bc6d524" providerId="ADAL" clId="{ED486670-7F59-4038-B9BC-E9238978F7A3}" dt="2019-05-06T12:29:00.524" v="1457" actId="554"/>
-          <ac:spMkLst>
-            <pc:docMk/>
-            <pc:sldMk cId="4037393715" sldId="256"/>
-            <ac:spMk id="114" creationId="{0CBDC3EA-16B2-432C-BAC7-9D3899C2584C}"/>
-          </ac:spMkLst>
-        </pc:spChg>
-        <pc:spChg chg="mod">
-          <ac:chgData name="Hollister, Jeff" userId="90904e2a-aa82-465e-9922-afce4bc6d524" providerId="ADAL" clId="{ED486670-7F59-4038-B9BC-E9238978F7A3}" dt="2019-05-02T19:05:28.889" v="1334" actId="20577"/>
-          <ac:spMkLst>
-            <pc:docMk/>
-            <pc:sldMk cId="4037393715" sldId="256"/>
-            <ac:spMk id="116" creationId="{4227A31B-ADAE-4A52-BAF8-2C136D66D48A}"/>
-          </ac:spMkLst>
-        </pc:spChg>
-        <pc:spChg chg="mod">
-          <ac:chgData name="Hollister, Jeff" userId="90904e2a-aa82-465e-9922-afce4bc6d524" providerId="ADAL" clId="{ED486670-7F59-4038-B9BC-E9238978F7A3}" dt="2019-05-02T19:06:54.901" v="1390" actId="113"/>
-          <ac:spMkLst>
-            <pc:docMk/>
-            <pc:sldMk cId="4037393715" sldId="256"/>
-            <ac:spMk id="117" creationId="{6B96F7EA-EBBC-42AB-9700-E1EB400F6E64}"/>
-          </ac:spMkLst>
-        </pc:spChg>
-        <pc:spChg chg="add mod">
-          <ac:chgData name="Hollister, Jeff" userId="90904e2a-aa82-465e-9922-afce4bc6d524" providerId="ADAL" clId="{ED486670-7F59-4038-B9BC-E9238978F7A3}" dt="2019-05-06T12:29:14.919" v="1458" actId="554"/>
-          <ac:spMkLst>
-            <pc:docMk/>
-            <pc:sldMk cId="4037393715" sldId="256"/>
-            <ac:spMk id="119" creationId="{C2017ADA-ED80-4F53-B5E9-E734B25FD51C}"/>
-          </ac:spMkLst>
-        </pc:spChg>
-        <pc:spChg chg="mod">
-          <ac:chgData name="Hollister, Jeff" userId="90904e2a-aa82-465e-9922-afce4bc6d524" providerId="ADAL" clId="{ED486670-7F59-4038-B9BC-E9238978F7A3}" dt="2019-05-02T19:06:11.500" v="1377" actId="20577"/>
-          <ac:spMkLst>
-            <pc:docMk/>
-            <pc:sldMk cId="4037393715" sldId="256"/>
-            <ac:spMk id="121" creationId="{28093264-CDD9-4E84-865D-BBBFF74C77B9}"/>
-          </ac:spMkLst>
-        </pc:spChg>
-        <pc:spChg chg="mod">
-          <ac:chgData name="Hollister, Jeff" userId="90904e2a-aa82-465e-9922-afce4bc6d524" providerId="ADAL" clId="{ED486670-7F59-4038-B9BC-E9238978F7A3}" dt="2019-05-06T12:25:27.309" v="1446" actId="20577"/>
-          <ac:spMkLst>
-            <pc:docMk/>
-            <pc:sldMk cId="4037393715" sldId="256"/>
-            <ac:spMk id="122" creationId="{8E5122A9-F45C-42BF-AC36-1495D2047006}"/>
-          </ac:spMkLst>
-        </pc:spChg>
-        <pc:spChg chg="add mod">
-          <ac:chgData name="Hollister, Jeff" userId="90904e2a-aa82-465e-9922-afce4bc6d524" providerId="ADAL" clId="{ED486670-7F59-4038-B9BC-E9238978F7A3}" dt="2019-05-06T12:29:14.919" v="1458" actId="554"/>
-          <ac:spMkLst>
-            <pc:docMk/>
-            <pc:sldMk cId="4037393715" sldId="256"/>
-            <ac:spMk id="124" creationId="{50ACC572-958B-443B-8C3C-BE14D33824D9}"/>
-          </ac:spMkLst>
-        </pc:spChg>
-        <pc:spChg chg="mod">
-          <ac:chgData name="Hollister, Jeff" userId="90904e2a-aa82-465e-9922-afce4bc6d524" providerId="ADAL" clId="{ED486670-7F59-4038-B9BC-E9238978F7A3}" dt="2019-05-02T19:05:59.378" v="1364" actId="20577"/>
-          <ac:spMkLst>
-            <pc:docMk/>
-            <pc:sldMk cId="4037393715" sldId="256"/>
-            <ac:spMk id="126" creationId="{0056F91C-D8E2-4B3E-B104-4450BEDBF4E8}"/>
-          </ac:spMkLst>
-        </pc:spChg>
-        <pc:spChg chg="mod">
-          <ac:chgData name="Hollister, Jeff" userId="90904e2a-aa82-465e-9922-afce4bc6d524" providerId="ADAL" clId="{ED486670-7F59-4038-B9BC-E9238978F7A3}" dt="2019-05-02T19:07:55.539" v="1406" actId="20577"/>
-          <ac:spMkLst>
-            <pc:docMk/>
-            <pc:sldMk cId="4037393715" sldId="256"/>
-            <ac:spMk id="127" creationId="{7EC1D9D6-7A9C-4696-9471-BE747BADF0A2}"/>
-          </ac:spMkLst>
-        </pc:spChg>
-        <pc:spChg chg="add mod">
-          <ac:chgData name="Hollister, Jeff" userId="90904e2a-aa82-465e-9922-afce4bc6d524" providerId="ADAL" clId="{ED486670-7F59-4038-B9BC-E9238978F7A3}" dt="2019-05-06T12:29:14.919" v="1458" actId="554"/>
-          <ac:spMkLst>
-            <pc:docMk/>
-            <pc:sldMk cId="4037393715" sldId="256"/>
-            <ac:spMk id="129" creationId="{D339B13B-F819-4880-8E0D-CCCF7485ED0E}"/>
-          </ac:spMkLst>
-        </pc:spChg>
-        <pc:spChg chg="mod">
-          <ac:chgData name="Hollister, Jeff" userId="90904e2a-aa82-465e-9922-afce4bc6d524" providerId="ADAL" clId="{ED486670-7F59-4038-B9BC-E9238978F7A3}" dt="2019-05-02T19:05:46.346" v="1349" actId="20577"/>
-          <ac:spMkLst>
-            <pc:docMk/>
-            <pc:sldMk cId="4037393715" sldId="256"/>
-            <ac:spMk id="131" creationId="{FF7E9A94-2C10-44AB-91EB-8AF4D6D06F02}"/>
-          </ac:spMkLst>
-        </pc:spChg>
-        <pc:spChg chg="mod">
-          <ac:chgData name="Hollister, Jeff" userId="90904e2a-aa82-465e-9922-afce4bc6d524" providerId="ADAL" clId="{ED486670-7F59-4038-B9BC-E9238978F7A3}" dt="2019-05-02T19:07:31.320" v="1403" actId="20577"/>
-          <ac:spMkLst>
-            <pc:docMk/>
-            <pc:sldMk cId="4037393715" sldId="256"/>
-            <ac:spMk id="132" creationId="{165956A5-53C0-49D2-A6BF-EEC73B0B526A}"/>
-          </ac:spMkLst>
-        </pc:spChg>
-        <pc:grpChg chg="add mod">
-          <ac:chgData name="Hollister, Jeff" userId="90904e2a-aa82-465e-9922-afce4bc6d524" providerId="ADAL" clId="{ED486670-7F59-4038-B9BC-E9238978F7A3}" dt="2019-05-06T12:59:22.846" v="1575" actId="164"/>
-          <ac:grpSpMkLst>
-            <pc:docMk/>
-            <pc:sldMk cId="4037393715" sldId="256"/>
-            <ac:grpSpMk id="3" creationId="{5F3A5354-A2F2-496C-8FF1-4144F3094C69}"/>
-          </ac:grpSpMkLst>
-        </pc:grpChg>
-        <pc:grpChg chg="add mod">
-          <ac:chgData name="Hollister, Jeff" userId="90904e2a-aa82-465e-9922-afce4bc6d524" providerId="ADAL" clId="{ED486670-7F59-4038-B9BC-E9238978F7A3}" dt="2019-05-06T12:58:35.769" v="1570" actId="164"/>
-          <ac:grpSpMkLst>
-            <pc:docMk/>
-            <pc:sldMk cId="4037393715" sldId="256"/>
-            <ac:grpSpMk id="10" creationId="{1BC14BB0-8615-428C-B9F9-0E8E839FFBA0}"/>
-          </ac:grpSpMkLst>
-        </pc:grpChg>
-        <pc:grpChg chg="add mod">
-          <ac:chgData name="Hollister, Jeff" userId="90904e2a-aa82-465e-9922-afce4bc6d524" providerId="ADAL" clId="{ED486670-7F59-4038-B9BC-E9238978F7A3}" dt="2019-05-06T12:58:46.685" v="1572" actId="164"/>
-          <ac:grpSpMkLst>
-            <pc:docMk/>
-            <pc:sldMk cId="4037393715" sldId="256"/>
-            <ac:grpSpMk id="11" creationId="{D0D3F184-FBF3-4015-8A20-02AAE3A8C85B}"/>
-          </ac:grpSpMkLst>
-        </pc:grpChg>
-        <pc:grpChg chg="add mod">
-          <ac:chgData name="Hollister, Jeff" userId="90904e2a-aa82-465e-9922-afce4bc6d524" providerId="ADAL" clId="{ED486670-7F59-4038-B9BC-E9238978F7A3}" dt="2019-05-06T12:59:22.846" v="1575" actId="164"/>
-          <ac:grpSpMkLst>
-            <pc:docMk/>
-            <pc:sldMk cId="4037393715" sldId="256"/>
-            <ac:grpSpMk id="12" creationId="{B97566DA-F2D5-4595-A6BB-C6258AE7A000}"/>
-          </ac:grpSpMkLst>
-        </pc:grpChg>
-        <pc:grpChg chg="add mod">
-          <ac:chgData name="Hollister, Jeff" userId="90904e2a-aa82-465e-9922-afce4bc6d524" providerId="ADAL" clId="{ED486670-7F59-4038-B9BC-E9238978F7A3}" dt="2019-05-06T12:59:22.846" v="1575" actId="164"/>
-          <ac:grpSpMkLst>
-            <pc:docMk/>
-            <pc:sldMk cId="4037393715" sldId="256"/>
-            <ac:grpSpMk id="13" creationId="{6846167F-C3D6-4165-AC86-110B1CC20F29}"/>
-          </ac:grpSpMkLst>
-        </pc:grpChg>
-        <pc:grpChg chg="add mod">
-          <ac:chgData name="Hollister, Jeff" userId="90904e2a-aa82-465e-9922-afce4bc6d524" providerId="ADAL" clId="{ED486670-7F59-4038-B9BC-E9238978F7A3}" dt="2019-05-06T12:59:09.953" v="1574" actId="164"/>
-          <ac:grpSpMkLst>
-            <pc:docMk/>
-            <pc:sldMk cId="4037393715" sldId="256"/>
-            <ac:grpSpMk id="23" creationId="{012324FA-EF9B-4B6E-A9A9-942BC520FAB7}"/>
-          </ac:grpSpMkLst>
-        </pc:grpChg>
-        <pc:grpChg chg="del">
-          <ac:chgData name="Hollister, Jeff" userId="90904e2a-aa82-465e-9922-afce4bc6d524" providerId="ADAL" clId="{ED486670-7F59-4038-B9BC-E9238978F7A3}" dt="2019-05-02T16:15:29.901" v="131" actId="165"/>
-          <ac:grpSpMkLst>
-            <pc:docMk/>
-            <pc:sldMk cId="4037393715" sldId="256"/>
-            <ac:grpSpMk id="45" creationId="{0D0D1B79-89F5-444E-9CA2-EA796D509836}"/>
-          </ac:grpSpMkLst>
-        </pc:grpChg>
-        <pc:grpChg chg="add mod">
-          <ac:chgData name="Hollister, Jeff" userId="90904e2a-aa82-465e-9922-afce4bc6d524" providerId="ADAL" clId="{ED486670-7F59-4038-B9BC-E9238978F7A3}" dt="2019-05-06T12:32:10.335" v="1489" actId="1035"/>
-          <ac:grpSpMkLst>
-            <pc:docMk/>
-            <pc:sldMk cId="4037393715" sldId="256"/>
-            <ac:grpSpMk id="101" creationId="{5B7F0953-F89A-477C-99DE-54CBC4836759}"/>
-          </ac:grpSpMkLst>
-        </pc:grpChg>
-        <pc:grpChg chg="add mod">
-          <ac:chgData name="Hollister, Jeff" userId="90904e2a-aa82-465e-9922-afce4bc6d524" providerId="ADAL" clId="{ED486670-7F59-4038-B9BC-E9238978F7A3}" dt="2019-05-06T12:32:10.335" v="1489" actId="1035"/>
-          <ac:grpSpMkLst>
-            <pc:docMk/>
-            <pc:sldMk cId="4037393715" sldId="256"/>
-            <ac:grpSpMk id="105" creationId="{E7DBB7C6-327F-4AA4-A0F9-0C8258CC1043}"/>
-          </ac:grpSpMkLst>
-        </pc:grpChg>
-        <pc:grpChg chg="add mod">
-          <ac:chgData name="Hollister, Jeff" userId="90904e2a-aa82-465e-9922-afce4bc6d524" providerId="ADAL" clId="{ED486670-7F59-4038-B9BC-E9238978F7A3}" dt="2019-05-02T19:00:15.332" v="948" actId="1036"/>
-          <ac:grpSpMkLst>
-            <pc:docMk/>
-            <pc:sldMk cId="4037393715" sldId="256"/>
-            <ac:grpSpMk id="110" creationId="{EE254810-1FD5-487C-9E5A-EA47C35A2605}"/>
-          </ac:grpSpMkLst>
-        </pc:grpChg>
-        <pc:grpChg chg="add mod">
-          <ac:chgData name="Hollister, Jeff" userId="90904e2a-aa82-465e-9922-afce4bc6d524" providerId="ADAL" clId="{ED486670-7F59-4038-B9BC-E9238978F7A3}" dt="2019-05-02T19:00:26.980" v="1039" actId="1038"/>
-          <ac:grpSpMkLst>
-            <pc:docMk/>
-            <pc:sldMk cId="4037393715" sldId="256"/>
-            <ac:grpSpMk id="115" creationId="{E7D3E79F-2C2D-46C5-A5E4-9F83457E81F3}"/>
-          </ac:grpSpMkLst>
-        </pc:grpChg>
-        <pc:grpChg chg="add mod">
-          <ac:chgData name="Hollister, Jeff" userId="90904e2a-aa82-465e-9922-afce4bc6d524" providerId="ADAL" clId="{ED486670-7F59-4038-B9BC-E9238978F7A3}" dt="2019-05-02T19:00:34.097" v="1089" actId="1037"/>
-          <ac:grpSpMkLst>
-            <pc:docMk/>
-            <pc:sldMk cId="4037393715" sldId="256"/>
-            <ac:grpSpMk id="120" creationId="{4648D32E-90BD-45E9-9D2E-656D04FDDEC2}"/>
-          </ac:grpSpMkLst>
-        </pc:grpChg>
-        <pc:grpChg chg="add mod">
-          <ac:chgData name="Hollister, Jeff" userId="90904e2a-aa82-465e-9922-afce4bc6d524" providerId="ADAL" clId="{ED486670-7F59-4038-B9BC-E9238978F7A3}" dt="2019-05-02T19:00:45.357" v="1169" actId="1036"/>
-          <ac:grpSpMkLst>
-            <pc:docMk/>
-            <pc:sldMk cId="4037393715" sldId="256"/>
-            <ac:grpSpMk id="125" creationId="{4B1391B0-885F-4AE4-8AF3-4C1C38F48673}"/>
-          </ac:grpSpMkLst>
-        </pc:grpChg>
-        <pc:grpChg chg="add mod">
-          <ac:chgData name="Hollister, Jeff" userId="90904e2a-aa82-465e-9922-afce4bc6d524" providerId="ADAL" clId="{ED486670-7F59-4038-B9BC-E9238978F7A3}" dt="2019-05-02T19:00:53.791" v="1245" actId="1037"/>
-          <ac:grpSpMkLst>
-            <pc:docMk/>
-            <pc:sldMk cId="4037393715" sldId="256"/>
-            <ac:grpSpMk id="130" creationId="{2112ED87-36AE-49A5-A9E7-E32401A4EA32}"/>
-          </ac:grpSpMkLst>
-        </pc:grpChg>
-        <pc:cxnChg chg="add del mod">
-          <ac:chgData name="Hollister, Jeff" userId="90904e2a-aa82-465e-9922-afce4bc6d524" providerId="ADAL" clId="{ED486670-7F59-4038-B9BC-E9238978F7A3}" dt="2019-05-02T18:54:21.268" v="803" actId="11529"/>
-          <ac:cxnSpMkLst>
-            <pc:docMk/>
-            <pc:sldMk cId="4037393715" sldId="256"/>
-            <ac:cxnSpMk id="16" creationId="{74982352-D867-41F1-AEE1-D776414441AC}"/>
-          </ac:cxnSpMkLst>
-        </pc:cxnChg>
-        <pc:cxnChg chg="add mod">
-          <ac:chgData name="Hollister, Jeff" userId="90904e2a-aa82-465e-9922-afce4bc6d524" providerId="ADAL" clId="{ED486670-7F59-4038-B9BC-E9238978F7A3}" dt="2019-05-02T18:55:01.648" v="811" actId="164"/>
-          <ac:cxnSpMkLst>
-            <pc:docMk/>
-            <pc:sldMk cId="4037393715" sldId="256"/>
-            <ac:cxnSpMk id="22" creationId="{9D141CA7-78FF-4583-AC95-8F66072B238C}"/>
-          </ac:cxnSpMkLst>
-        </pc:cxnChg>
-        <pc:cxnChg chg="mod">
-          <ac:chgData name="Hollister, Jeff" userId="90904e2a-aa82-465e-9922-afce4bc6d524" providerId="ADAL" clId="{ED486670-7F59-4038-B9BC-E9238978F7A3}" dt="2019-05-06T12:58:09.423" v="1567" actId="1037"/>
-          <ac:cxnSpMkLst>
-            <pc:docMk/>
-            <pc:sldMk cId="4037393715" sldId="256"/>
-            <ac:cxnSpMk id="36" creationId="{0DCD3480-AF90-4303-96DA-AEAFF95ECE3E}"/>
-          </ac:cxnSpMkLst>
-        </pc:cxnChg>
-        <pc:cxnChg chg="mod">
-          <ac:chgData name="Hollister, Jeff" userId="90904e2a-aa82-465e-9922-afce4bc6d524" providerId="ADAL" clId="{ED486670-7F59-4038-B9BC-E9238978F7A3}" dt="2019-05-06T12:58:09.423" v="1567" actId="1037"/>
-          <ac:cxnSpMkLst>
-            <pc:docMk/>
-            <pc:sldMk cId="4037393715" sldId="256"/>
-            <ac:cxnSpMk id="43" creationId="{6B15B882-AB86-4D06-A728-ECC4F25E7823}"/>
-          </ac:cxnSpMkLst>
-        </pc:cxnChg>
-        <pc:cxnChg chg="mod">
-          <ac:chgData name="Hollister, Jeff" userId="90904e2a-aa82-465e-9922-afce4bc6d524" providerId="ADAL" clId="{ED486670-7F59-4038-B9BC-E9238978F7A3}" dt="2019-05-02T19:05:01.571" v="1312" actId="1037"/>
-          <ac:cxnSpMkLst>
-            <pc:docMk/>
-            <pc:sldMk cId="4037393715" sldId="256"/>
-            <ac:cxnSpMk id="113" creationId="{B7B2B526-6875-4751-84CB-C87FBF0C190D}"/>
-          </ac:cxnSpMkLst>
-        </pc:cxnChg>
-      </pc:sldChg>
       <pc:sldChg chg="addSp delSp modSp">
-        <pc:chgData name="Hollister, Jeff" userId="90904e2a-aa82-465e-9922-afce4bc6d524" providerId="ADAL" clId="{ED486670-7F59-4038-B9BC-E9238978F7A3}" dt="2019-05-06T17:24:18.589" v="2381" actId="20577"/>
+        <pc:chgData name="Hollister, Jeff" userId="90904e2a-aa82-465e-9922-afce4bc6d524" providerId="ADAL" clId="{ED486670-7F59-4038-B9BC-E9238978F7A3}" dt="2019-05-14T12:46:40.107" v="2437" actId="20577"/>
         <pc:sldMkLst>
           <pc:docMk/>
           <pc:sldMk cId="1258879937" sldId="257"/>
@@ -1031,7 +144,7 @@
           </ac:spMkLst>
         </pc:spChg>
         <pc:spChg chg="mod">
-          <ac:chgData name="Hollister, Jeff" userId="90904e2a-aa82-465e-9922-afce4bc6d524" providerId="ADAL" clId="{ED486670-7F59-4038-B9BC-E9238978F7A3}" dt="2019-05-06T17:21:50.147" v="2372" actId="20577"/>
+          <ac:chgData name="Hollister, Jeff" userId="90904e2a-aa82-465e-9922-afce4bc6d524" providerId="ADAL" clId="{ED486670-7F59-4038-B9BC-E9238978F7A3}" dt="2019-05-14T12:44:28.435" v="2422" actId="20577"/>
           <ac:spMkLst>
             <pc:docMk/>
             <pc:sldMk cId="1258879937" sldId="257"/>
@@ -1063,7 +176,7 @@
           </ac:spMkLst>
         </pc:spChg>
         <pc:spChg chg="mod">
-          <ac:chgData name="Hollister, Jeff" userId="90904e2a-aa82-465e-9922-afce4bc6d524" providerId="ADAL" clId="{ED486670-7F59-4038-B9BC-E9238978F7A3}" dt="2019-05-06T14:12:45.303" v="2238" actId="12788"/>
+          <ac:chgData name="Hollister, Jeff" userId="90904e2a-aa82-465e-9922-afce4bc6d524" providerId="ADAL" clId="{ED486670-7F59-4038-B9BC-E9238978F7A3}" dt="2019-05-14T12:35:41.033" v="2420" actId="12788"/>
           <ac:spMkLst>
             <pc:docMk/>
             <pc:sldMk cId="1258879937" sldId="257"/>
@@ -1095,7 +208,7 @@
           </ac:spMkLst>
         </pc:spChg>
         <pc:spChg chg="mod">
-          <ac:chgData name="Hollister, Jeff" userId="90904e2a-aa82-465e-9922-afce4bc6d524" providerId="ADAL" clId="{ED486670-7F59-4038-B9BC-E9238978F7A3}" dt="2019-05-06T16:45:41.963" v="2298" actId="207"/>
+          <ac:chgData name="Hollister, Jeff" userId="90904e2a-aa82-465e-9922-afce4bc6d524" providerId="ADAL" clId="{ED486670-7F59-4038-B9BC-E9238978F7A3}" dt="2019-05-14T12:46:40.107" v="2437" actId="20577"/>
           <ac:spMkLst>
             <pc:docMk/>
             <pc:sldMk cId="1258879937" sldId="257"/>
@@ -1327,7 +440,7 @@
           </ac:spMkLst>
         </pc:spChg>
         <pc:spChg chg="mod">
-          <ac:chgData name="Hollister, Jeff" userId="90904e2a-aa82-465e-9922-afce4bc6d524" providerId="ADAL" clId="{ED486670-7F59-4038-B9BC-E9238978F7A3}" dt="2019-05-06T17:20:09.883" v="2361" actId="20577"/>
+          <ac:chgData name="Hollister, Jeff" userId="90904e2a-aa82-465e-9922-afce4bc6d524" providerId="ADAL" clId="{ED486670-7F59-4038-B9BC-E9238978F7A3}" dt="2019-05-14T12:26:23.388" v="2407" actId="20577"/>
           <ac:spMkLst>
             <pc:docMk/>
             <pc:sldMk cId="1258879937" sldId="257"/>
@@ -1375,7 +488,7 @@
           </ac:spMkLst>
         </pc:spChg>
         <pc:spChg chg="mod">
-          <ac:chgData name="Hollister, Jeff" userId="90904e2a-aa82-465e-9922-afce4bc6d524" providerId="ADAL" clId="{ED486670-7F59-4038-B9BC-E9238978F7A3}" dt="2019-05-06T14:07:40.492" v="2118" actId="20577"/>
+          <ac:chgData name="Hollister, Jeff" userId="90904e2a-aa82-465e-9922-afce4bc6d524" providerId="ADAL" clId="{ED486670-7F59-4038-B9BC-E9238978F7A3}" dt="2019-05-14T12:44:36.639" v="2424" actId="20577"/>
           <ac:spMkLst>
             <pc:docMk/>
             <pc:sldMk cId="1258879937" sldId="257"/>
@@ -1407,7 +520,7 @@
           </ac:spMkLst>
         </pc:spChg>
         <pc:spChg chg="mod">
-          <ac:chgData name="Hollister, Jeff" userId="90904e2a-aa82-465e-9922-afce4bc6d524" providerId="ADAL" clId="{ED486670-7F59-4038-B9BC-E9238978F7A3}" dt="2019-05-06T17:20:20.948" v="2362" actId="20577"/>
+          <ac:chgData name="Hollister, Jeff" userId="90904e2a-aa82-465e-9922-afce4bc6d524" providerId="ADAL" clId="{ED486670-7F59-4038-B9BC-E9238978F7A3}" dt="2019-05-14T12:45:45.011" v="2431" actId="20577"/>
           <ac:spMkLst>
             <pc:docMk/>
             <pc:sldMk cId="1258879937" sldId="257"/>
@@ -1415,7 +528,7 @@
           </ac:spMkLst>
         </pc:spChg>
         <pc:spChg chg="mod">
-          <ac:chgData name="Hollister, Jeff" userId="90904e2a-aa82-465e-9922-afce4bc6d524" providerId="ADAL" clId="{ED486670-7F59-4038-B9BC-E9238978F7A3}" dt="2019-05-06T14:08:17.516" v="2144" actId="20577"/>
+          <ac:chgData name="Hollister, Jeff" userId="90904e2a-aa82-465e-9922-afce4bc6d524" providerId="ADAL" clId="{ED486670-7F59-4038-B9BC-E9238978F7A3}" dt="2019-05-14T12:45:20.285" v="2427" actId="20577"/>
           <ac:spMkLst>
             <pc:docMk/>
             <pc:sldMk cId="1258879937" sldId="257"/>
@@ -1455,7 +568,7 @@
           </ac:spMkLst>
         </pc:spChg>
         <pc:spChg chg="mod">
-          <ac:chgData name="Hollister, Jeff" userId="90904e2a-aa82-465e-9922-afce4bc6d524" providerId="ADAL" clId="{ED486670-7F59-4038-B9BC-E9238978F7A3}" dt="2019-05-06T14:08:52.772" v="2161" actId="20577"/>
+          <ac:chgData name="Hollister, Jeff" userId="90904e2a-aa82-465e-9922-afce4bc6d524" providerId="ADAL" clId="{ED486670-7F59-4038-B9BC-E9238978F7A3}" dt="2019-05-14T12:25:15.423" v="2401" actId="20577"/>
           <ac:spMkLst>
             <pc:docMk/>
             <pc:sldMk cId="1258879937" sldId="257"/>
@@ -1503,7 +616,7 @@
           </ac:spMkLst>
         </pc:spChg>
         <pc:spChg chg="mod">
-          <ac:chgData name="Hollister, Jeff" userId="90904e2a-aa82-465e-9922-afce4bc6d524" providerId="ADAL" clId="{ED486670-7F59-4038-B9BC-E9238978F7A3}" dt="2019-05-06T14:09:26.789" v="2187" actId="20577"/>
+          <ac:chgData name="Hollister, Jeff" userId="90904e2a-aa82-465e-9922-afce4bc6d524" providerId="ADAL" clId="{ED486670-7F59-4038-B9BC-E9238978F7A3}" dt="2019-05-14T12:25:18.783" v="2403" actId="20577"/>
           <ac:spMkLst>
             <pc:docMk/>
             <pc:sldMk cId="1258879937" sldId="257"/>
@@ -1527,7 +640,7 @@
           </ac:spMkLst>
         </pc:spChg>
         <pc:spChg chg="mod">
-          <ac:chgData name="Hollister, Jeff" userId="90904e2a-aa82-465e-9922-afce4bc6d524" providerId="ADAL" clId="{ED486670-7F59-4038-B9BC-E9238978F7A3}" dt="2019-05-06T14:09:01.219" v="2167" actId="20577"/>
+          <ac:chgData name="Hollister, Jeff" userId="90904e2a-aa82-465e-9922-afce4bc6d524" providerId="ADAL" clId="{ED486670-7F59-4038-B9BC-E9238978F7A3}" dt="2019-05-14T12:22:26.710" v="2384" actId="20577"/>
           <ac:spMkLst>
             <pc:docMk/>
             <pc:sldMk cId="1258879937" sldId="257"/>
@@ -1543,7 +656,7 @@
           </ac:spMkLst>
         </pc:spChg>
         <pc:spChg chg="mod">
-          <ac:chgData name="Hollister, Jeff" userId="90904e2a-aa82-465e-9922-afce4bc6d524" providerId="ADAL" clId="{ED486670-7F59-4038-B9BC-E9238978F7A3}" dt="2019-05-06T14:09:30.609" v="2191" actId="20577"/>
+          <ac:chgData name="Hollister, Jeff" userId="90904e2a-aa82-465e-9922-afce4bc6d524" providerId="ADAL" clId="{ED486670-7F59-4038-B9BC-E9238978F7A3}" dt="2019-05-14T12:25:21.798" v="2405" actId="20577"/>
           <ac:spMkLst>
             <pc:docMk/>
             <pc:sldMk cId="1258879937" sldId="257"/>
@@ -2167,7 +1280,7 @@
           <a:p>
             <a:fld id="{F7167FF9-F47C-4F59-88DD-9CEB65E35CFA}" type="datetimeFigureOut">
               <a:rPr lang="en-US" smtClean="0"/>
-              <a:t>5/6/2019</a:t>
+              <a:t>5/14/2019</a:t>
             </a:fld>
             <a:endParaRPr lang="en-US"/>
           </a:p>
@@ -2337,7 +1450,7 @@
           <a:p>
             <a:fld id="{F7167FF9-F47C-4F59-88DD-9CEB65E35CFA}" type="datetimeFigureOut">
               <a:rPr lang="en-US" smtClean="0"/>
-              <a:t>5/6/2019</a:t>
+              <a:t>5/14/2019</a:t>
             </a:fld>
             <a:endParaRPr lang="en-US"/>
           </a:p>
@@ -2517,7 +1630,7 @@
           <a:p>
             <a:fld id="{F7167FF9-F47C-4F59-88DD-9CEB65E35CFA}" type="datetimeFigureOut">
               <a:rPr lang="en-US" smtClean="0"/>
-              <a:t>5/6/2019</a:t>
+              <a:t>5/14/2019</a:t>
             </a:fld>
             <a:endParaRPr lang="en-US"/>
           </a:p>
@@ -2687,7 +1800,7 @@
           <a:p>
             <a:fld id="{F7167FF9-F47C-4F59-88DD-9CEB65E35CFA}" type="datetimeFigureOut">
               <a:rPr lang="en-US" smtClean="0"/>
-              <a:t>5/6/2019</a:t>
+              <a:t>5/14/2019</a:t>
             </a:fld>
             <a:endParaRPr lang="en-US"/>
           </a:p>
@@ -2931,7 +2044,7 @@
           <a:p>
             <a:fld id="{F7167FF9-F47C-4F59-88DD-9CEB65E35CFA}" type="datetimeFigureOut">
               <a:rPr lang="en-US" smtClean="0"/>
-              <a:t>5/6/2019</a:t>
+              <a:t>5/14/2019</a:t>
             </a:fld>
             <a:endParaRPr lang="en-US"/>
           </a:p>
@@ -3163,7 +2276,7 @@
           <a:p>
             <a:fld id="{F7167FF9-F47C-4F59-88DD-9CEB65E35CFA}" type="datetimeFigureOut">
               <a:rPr lang="en-US" smtClean="0"/>
-              <a:t>5/6/2019</a:t>
+              <a:t>5/14/2019</a:t>
             </a:fld>
             <a:endParaRPr lang="en-US"/>
           </a:p>
@@ -3530,7 +2643,7 @@
           <a:p>
             <a:fld id="{F7167FF9-F47C-4F59-88DD-9CEB65E35CFA}" type="datetimeFigureOut">
               <a:rPr lang="en-US" smtClean="0"/>
-              <a:t>5/6/2019</a:t>
+              <a:t>5/14/2019</a:t>
             </a:fld>
             <a:endParaRPr lang="en-US"/>
           </a:p>
@@ -3648,7 +2761,7 @@
           <a:p>
             <a:fld id="{F7167FF9-F47C-4F59-88DD-9CEB65E35CFA}" type="datetimeFigureOut">
               <a:rPr lang="en-US" smtClean="0"/>
-              <a:t>5/6/2019</a:t>
+              <a:t>5/14/2019</a:t>
             </a:fld>
             <a:endParaRPr lang="en-US"/>
           </a:p>
@@ -3743,7 +2856,7 @@
           <a:p>
             <a:fld id="{F7167FF9-F47C-4F59-88DD-9CEB65E35CFA}" type="datetimeFigureOut">
               <a:rPr lang="en-US" smtClean="0"/>
-              <a:t>5/6/2019</a:t>
+              <a:t>5/14/2019</a:t>
             </a:fld>
             <a:endParaRPr lang="en-US"/>
           </a:p>
@@ -4020,7 +3133,7 @@
           <a:p>
             <a:fld id="{F7167FF9-F47C-4F59-88DD-9CEB65E35CFA}" type="datetimeFigureOut">
               <a:rPr lang="en-US" smtClean="0"/>
-              <a:t>5/6/2019</a:t>
+              <a:t>5/14/2019</a:t>
             </a:fld>
             <a:endParaRPr lang="en-US"/>
           </a:p>
@@ -4277,7 +3390,7 @@
           <a:p>
             <a:fld id="{F7167FF9-F47C-4F59-88DD-9CEB65E35CFA}" type="datetimeFigureOut">
               <a:rPr lang="en-US" smtClean="0"/>
-              <a:t>5/6/2019</a:t>
+              <a:t>5/14/2019</a:t>
             </a:fld>
             <a:endParaRPr lang="en-US"/>
           </a:p>
@@ -4490,7 +3603,7 @@
           <a:p>
             <a:fld id="{F7167FF9-F47C-4F59-88DD-9CEB65E35CFA}" type="datetimeFigureOut">
               <a:rPr lang="en-US" smtClean="0"/>
-              <a:t>5/6/2019</a:t>
+              <a:t>5/14/2019</a:t>
             </a:fld>
             <a:endParaRPr lang="en-US"/>
           </a:p>
@@ -5051,7 +4164,7 @@
                 <a:latin typeface="Roboto Condensed" panose="02000000000000000000" pitchFamily="2" charset="0"/>
                 <a:ea typeface="Roboto Condensed" panose="02000000000000000000" pitchFamily="2" charset="0"/>
               </a:rPr>
-              <a:t>mean = 3.67</a:t>
+              <a:t>mean = 3.66</a:t>
             </a:r>
           </a:p>
           <a:p>
@@ -5076,7 +4189,7 @@
                 <a:latin typeface="Roboto Condensed" panose="02000000000000000000" pitchFamily="2" charset="0"/>
                 <a:ea typeface="Roboto Condensed" panose="02000000000000000000" pitchFamily="2" charset="0"/>
               </a:rPr>
-              <a:t> = 0.92</a:t>
+              <a:t> = 0.94</a:t>
             </a:r>
           </a:p>
         </p:txBody>
@@ -5261,7 +4374,7 @@
         </p:nvSpPr>
         <p:spPr>
           <a:xfrm>
-            <a:off x="5541629" y="14820"/>
+            <a:off x="5548843" y="14820"/>
             <a:ext cx="646331" cy="307777"/>
           </a:xfrm>
           <a:prstGeom prst="rect">
@@ -5560,7 +4673,7 @@
                 <a:latin typeface="Roboto Condensed" panose="02000000000000000000" pitchFamily="2" charset="0"/>
                 <a:ea typeface="Roboto Condensed" panose="02000000000000000000" pitchFamily="2" charset="0"/>
               </a:rPr>
-              <a:t>0.20</a:t>
+              <a:t>0.21</a:t>
             </a:r>
           </a:p>
           <a:p>
@@ -5576,8 +4689,19 @@
                 <a:latin typeface="Roboto Condensed" panose="02000000000000000000" pitchFamily="2" charset="0"/>
                 <a:ea typeface="Roboto Condensed" panose="02000000000000000000" pitchFamily="2" charset="0"/>
               </a:rPr>
-              <a:t> = 1.15</a:t>
-            </a:r>
+              <a:t> </a:t>
+            </a:r>
+            <a:r>
+              <a:rPr lang="en-US" sz="1100">
+                <a:latin typeface="Roboto Condensed" panose="02000000000000000000" pitchFamily="2" charset="0"/>
+                <a:ea typeface="Roboto Condensed" panose="02000000000000000000" pitchFamily="2" charset="0"/>
+              </a:rPr>
+              <a:t>= 1.15</a:t>
+            </a:r>
+            <a:endParaRPr lang="en-US" sz="1100" dirty="0">
+              <a:latin typeface="Roboto Condensed" panose="02000000000000000000" pitchFamily="2" charset="0"/>
+              <a:ea typeface="Roboto Condensed" panose="02000000000000000000" pitchFamily="2" charset="0"/>
+            </a:endParaRPr>
           </a:p>
           <a:p>
             <a:r>
@@ -6778,7 +5902,7 @@
                           <a:srgbClr val="8B0000"/>
                         </a:solidFill>
                       </a:rPr>
-                      <a:t>1.02</a:t>
+                      <a:t>1.01</a:t>
                     </a:r>
                   </a:p>
                 </p:txBody>
@@ -7286,14 +6410,14 @@
                       <a:pPr algn="ctr"/>
                       <a:r>
                         <a:rPr lang="en-US" sz="1100" dirty="0"/>
-                        <a:t>(3 – 3.65)</a:t>
+                        <a:t>(3 – 3.66)</a:t>
                       </a:r>
                       <a:br>
                         <a:rPr lang="en-US" sz="1100" dirty="0"/>
                       </a:br>
                       <a:r>
                         <a:rPr lang="en-US" sz="1100" dirty="0"/>
-                        <a:t>0.92 </a:t>
+                        <a:t>0.94 </a:t>
                       </a:r>
                     </a:p>
                   </p:txBody>
@@ -7609,10 +6733,10 @@
               </p:nvGrpSpPr>
               <p:grpSpPr>
                 <a:xfrm>
-                  <a:off x="1534014" y="1167152"/>
-                  <a:ext cx="1297712" cy="430887"/>
-                  <a:chOff x="1529449" y="1067142"/>
-                  <a:chExt cx="1297712" cy="430887"/>
+                  <a:off x="1497947" y="1167152"/>
+                  <a:ext cx="1333779" cy="430887"/>
+                  <a:chOff x="1493382" y="1067142"/>
+                  <a:chExt cx="1333779" cy="430887"/>
                 </a:xfrm>
               </p:grpSpPr>
               <p:sp>
@@ -7673,10 +6797,10 @@
                 </p:nvGrpSpPr>
                 <p:grpSpPr>
                   <a:xfrm>
-                    <a:off x="1529449" y="1067142"/>
-                    <a:ext cx="837089" cy="430887"/>
-                    <a:chOff x="1524633" y="966294"/>
-                    <a:chExt cx="837089" cy="430887"/>
+                    <a:off x="1493382" y="1067142"/>
+                    <a:ext cx="909223" cy="430887"/>
+                    <a:chOff x="1488566" y="966294"/>
+                    <a:chExt cx="909223" cy="430887"/>
                   </a:xfrm>
                 </p:grpSpPr>
                 <p:sp>
@@ -7693,8 +6817,8 @@
                   </p:nvSpPr>
                   <p:spPr>
                     <a:xfrm>
-                      <a:off x="1524633" y="966294"/>
-                      <a:ext cx="837089" cy="430887"/>
+                      <a:off x="1488566" y="966294"/>
+                      <a:ext cx="909223" cy="430887"/>
                     </a:xfrm>
                     <a:prstGeom prst="rect">
                       <a:avLst/>
@@ -7710,14 +6834,14 @@
                       <a:pPr algn="ctr"/>
                       <a:r>
                         <a:rPr lang="en-US" sz="1100" dirty="0"/>
-                        <a:t>(4.3 – 3.65)</a:t>
+                        <a:t>(4.33 – 3.66)</a:t>
                       </a:r>
                       <a:br>
                         <a:rPr lang="en-US" sz="1100" dirty="0"/>
                       </a:br>
                       <a:r>
                         <a:rPr lang="en-US" sz="1100" dirty="0"/>
-                        <a:t>0.92 </a:t>
+                        <a:t>0.94 </a:t>
                       </a:r>
                     </a:p>
                   </p:txBody>
@@ -8152,14 +7276,14 @@
                       <a:pPr algn="ctr"/>
                       <a:r>
                         <a:rPr lang="en-US" sz="1100" dirty="0"/>
-                        <a:t>(13 – 12.43)</a:t>
+                        <a:t>(13 – 12.44)</a:t>
                       </a:r>
                       <a:br>
                         <a:rPr lang="en-US" sz="1100" dirty="0"/>
                       </a:br>
                       <a:r>
                         <a:rPr lang="en-US" sz="1100" dirty="0"/>
-                        <a:t>1.91 </a:t>
+                        <a:t>1.90 </a:t>
                       </a:r>
                     </a:p>
                   </p:txBody>
@@ -8570,14 +7694,14 @@
                       <a:pPr algn="ctr"/>
                       <a:r>
                         <a:rPr lang="en-US" sz="1100" dirty="0"/>
-                        <a:t>(14 – 12.43)</a:t>
+                        <a:t>(14 – 12.44)</a:t>
                       </a:r>
                       <a:br>
                         <a:rPr lang="en-US" sz="1100" dirty="0"/>
                       </a:br>
                       <a:r>
                         <a:rPr lang="en-US" sz="1100" dirty="0"/>
-                        <a:t>1.91 </a:t>
+                        <a:t>1.90 </a:t>
                       </a:r>
                     </a:p>
                   </p:txBody>
@@ -8830,10 +7954,10 @@
             </p:nvGrpSpPr>
             <p:grpSpPr>
               <a:xfrm>
-                <a:off x="1461878" y="562016"/>
-                <a:ext cx="1400024" cy="1036023"/>
-                <a:chOff x="1461878" y="562016"/>
-                <a:chExt cx="1400024" cy="1036023"/>
+                <a:off x="1425811" y="562016"/>
+                <a:ext cx="1436091" cy="1036023"/>
+                <a:chOff x="1425811" y="562016"/>
+                <a:chExt cx="1436091" cy="1036023"/>
               </a:xfrm>
             </p:grpSpPr>
             <p:sp>
@@ -8874,7 +7998,7 @@
                   <a:pPr algn="ctr"/>
                   <a:r>
                     <a:rPr lang="en-US" sz="1100" dirty="0"/>
-                    <a:t>10.3</a:t>
+                    <a:t>10.33</a:t>
                   </a:r>
                 </a:p>
               </p:txBody>
@@ -8893,10 +8017,10 @@
               </p:nvGrpSpPr>
               <p:grpSpPr>
                 <a:xfrm>
-                  <a:off x="1461878" y="1167152"/>
-                  <a:ext cx="1391489" cy="430887"/>
-                  <a:chOff x="1457313" y="1067142"/>
-                  <a:chExt cx="1391489" cy="430887"/>
+                  <a:off x="1425811" y="1167152"/>
+                  <a:ext cx="1427556" cy="430887"/>
+                  <a:chOff x="1421246" y="1067142"/>
+                  <a:chExt cx="1427556" cy="430887"/>
                 </a:xfrm>
               </p:grpSpPr>
               <p:sp>
@@ -8957,10 +8081,10 @@
                 </p:nvGrpSpPr>
                 <p:grpSpPr>
                   <a:xfrm>
-                    <a:off x="1457313" y="1067142"/>
-                    <a:ext cx="981359" cy="430887"/>
-                    <a:chOff x="1452497" y="966294"/>
-                    <a:chExt cx="981359" cy="430887"/>
+                    <a:off x="1421246" y="1067142"/>
+                    <a:ext cx="1053494" cy="430887"/>
+                    <a:chOff x="1416430" y="966294"/>
+                    <a:chExt cx="1053494" cy="430887"/>
                   </a:xfrm>
                 </p:grpSpPr>
                 <p:sp>
@@ -8977,8 +8101,8 @@
                   </p:nvSpPr>
                   <p:spPr>
                     <a:xfrm>
-                      <a:off x="1452497" y="966294"/>
-                      <a:ext cx="981359" cy="430887"/>
+                      <a:off x="1416430" y="966294"/>
+                      <a:ext cx="1053494" cy="430887"/>
                     </a:xfrm>
                     <a:prstGeom prst="rect">
                       <a:avLst/>
@@ -8994,14 +8118,14 @@
                       <a:pPr algn="ctr"/>
                       <a:r>
                         <a:rPr lang="en-US" sz="1100" dirty="0"/>
-                        <a:t>(10.3 – 12.42)</a:t>
+                        <a:t>(10.33 – 12.44)</a:t>
                       </a:r>
                       <a:br>
                         <a:rPr lang="en-US" sz="1100" dirty="0"/>
                       </a:br>
                       <a:r>
                         <a:rPr lang="en-US" sz="1100" dirty="0"/>
-                        <a:t>1.91 </a:t>
+                        <a:t>1.90 </a:t>
                       </a:r>
                     </a:p>
                   </p:txBody>

</xml_diff>